<commit_message>
Creando Portada y Modificando
Modifique portada, añadi nombre de los integrantes, añadi información relacionada a mi tema y ordene las diapositivas
</commit_message>
<xml_diff>
--- a/Expo/Expo_Listas.pptx
+++ b/Expo/Expo_Listas.pptx
@@ -8,6 +8,7 @@
     <p:sldId id="256" r:id="rId2"/>
     <p:sldId id="257" r:id="rId3"/>
     <p:sldId id="258" r:id="rId4"/>
+    <p:sldId id="259" r:id="rId5"/>
   </p:sldIdLst>
   <p:sldSz cx="12192000" cy="6858000"/>
   <p:notesSz cx="6858000" cy="9144000"/>
@@ -263,7 +264,7 @@
           <a:p>
             <a:fld id="{5F069921-8D55-4BEA-8BE8-79909F57DFDF}" type="datetimeFigureOut">
               <a:rPr lang="es-MX" smtClean="0"/>
-              <a:t>29/10/2020</a:t>
+              <a:t>30/10/2020</a:t>
             </a:fld>
             <a:endParaRPr lang="es-MX"/>
           </a:p>
@@ -463,7 +464,7 @@
           <a:p>
             <a:fld id="{5F069921-8D55-4BEA-8BE8-79909F57DFDF}" type="datetimeFigureOut">
               <a:rPr lang="es-MX" smtClean="0"/>
-              <a:t>29/10/2020</a:t>
+              <a:t>30/10/2020</a:t>
             </a:fld>
             <a:endParaRPr lang="es-MX"/>
           </a:p>
@@ -673,7 +674,7 @@
           <a:p>
             <a:fld id="{5F069921-8D55-4BEA-8BE8-79909F57DFDF}" type="datetimeFigureOut">
               <a:rPr lang="es-MX" smtClean="0"/>
-              <a:t>29/10/2020</a:t>
+              <a:t>30/10/2020</a:t>
             </a:fld>
             <a:endParaRPr lang="es-MX"/>
           </a:p>
@@ -873,7 +874,7 @@
           <a:p>
             <a:fld id="{5F069921-8D55-4BEA-8BE8-79909F57DFDF}" type="datetimeFigureOut">
               <a:rPr lang="es-MX" smtClean="0"/>
-              <a:t>29/10/2020</a:t>
+              <a:t>30/10/2020</a:t>
             </a:fld>
             <a:endParaRPr lang="es-MX"/>
           </a:p>
@@ -1149,7 +1150,7 @@
           <a:p>
             <a:fld id="{5F069921-8D55-4BEA-8BE8-79909F57DFDF}" type="datetimeFigureOut">
               <a:rPr lang="es-MX" smtClean="0"/>
-              <a:t>29/10/2020</a:t>
+              <a:t>30/10/2020</a:t>
             </a:fld>
             <a:endParaRPr lang="es-MX"/>
           </a:p>
@@ -1417,7 +1418,7 @@
           <a:p>
             <a:fld id="{5F069921-8D55-4BEA-8BE8-79909F57DFDF}" type="datetimeFigureOut">
               <a:rPr lang="es-MX" smtClean="0"/>
-              <a:t>29/10/2020</a:t>
+              <a:t>30/10/2020</a:t>
             </a:fld>
             <a:endParaRPr lang="es-MX"/>
           </a:p>
@@ -1832,7 +1833,7 @@
           <a:p>
             <a:fld id="{5F069921-8D55-4BEA-8BE8-79909F57DFDF}" type="datetimeFigureOut">
               <a:rPr lang="es-MX" smtClean="0"/>
-              <a:t>29/10/2020</a:t>
+              <a:t>30/10/2020</a:t>
             </a:fld>
             <a:endParaRPr lang="es-MX"/>
           </a:p>
@@ -1974,7 +1975,7 @@
           <a:p>
             <a:fld id="{5F069921-8D55-4BEA-8BE8-79909F57DFDF}" type="datetimeFigureOut">
               <a:rPr lang="es-MX" smtClean="0"/>
-              <a:t>29/10/2020</a:t>
+              <a:t>30/10/2020</a:t>
             </a:fld>
             <a:endParaRPr lang="es-MX"/>
           </a:p>
@@ -2087,7 +2088,7 @@
           <a:p>
             <a:fld id="{5F069921-8D55-4BEA-8BE8-79909F57DFDF}" type="datetimeFigureOut">
               <a:rPr lang="es-MX" smtClean="0"/>
-              <a:t>29/10/2020</a:t>
+              <a:t>30/10/2020</a:t>
             </a:fld>
             <a:endParaRPr lang="es-MX"/>
           </a:p>
@@ -2400,7 +2401,7 @@
           <a:p>
             <a:fld id="{5F069921-8D55-4BEA-8BE8-79909F57DFDF}" type="datetimeFigureOut">
               <a:rPr lang="es-MX" smtClean="0"/>
-              <a:t>29/10/2020</a:t>
+              <a:t>30/10/2020</a:t>
             </a:fld>
             <a:endParaRPr lang="es-MX"/>
           </a:p>
@@ -2689,7 +2690,7 @@
           <a:p>
             <a:fld id="{5F069921-8D55-4BEA-8BE8-79909F57DFDF}" type="datetimeFigureOut">
               <a:rPr lang="es-MX" smtClean="0"/>
-              <a:t>29/10/2020</a:t>
+              <a:t>30/10/2020</a:t>
             </a:fld>
             <a:endParaRPr lang="es-MX"/>
           </a:p>
@@ -2932,7 +2933,7 @@
           <a:p>
             <a:fld id="{5F069921-8D55-4BEA-8BE8-79909F57DFDF}" type="datetimeFigureOut">
               <a:rPr lang="es-MX" smtClean="0"/>
-              <a:t>29/10/2020</a:t>
+              <a:t>30/10/2020</a:t>
             </a:fld>
             <a:endParaRPr lang="es-MX"/>
           </a:p>
@@ -3335,194 +3336,11 @@
 <file path=ppt/slides/slide1.xml><?xml version="1.0" encoding="utf-8"?>
 <p:sld xmlns:a="http://schemas.openxmlformats.org/drawingml/2006/main" xmlns:r="http://schemas.openxmlformats.org/officeDocument/2006/relationships" xmlns:p="http://schemas.openxmlformats.org/presentationml/2006/main">
   <p:cSld>
-    <p:spTree>
-      <p:nvGrpSpPr>
-        <p:cNvPr id="1" name=""/>
-        <p:cNvGrpSpPr/>
-        <p:nvPr/>
-      </p:nvGrpSpPr>
-      <p:grpSpPr>
-        <a:xfrm>
-          <a:off x="0" y="0"/>
-          <a:ext cx="0" cy="0"/>
-          <a:chOff x="0" y="0"/>
-          <a:chExt cx="0" cy="0"/>
-        </a:xfrm>
-      </p:grpSpPr>
-      <p:sp>
-        <p:nvSpPr>
-          <p:cNvPr id="2" name="Título 1">
-            <a:extLst>
-              <a:ext uri="{FF2B5EF4-FFF2-40B4-BE49-F238E27FC236}">
-                <a16:creationId xmlns:a16="http://schemas.microsoft.com/office/drawing/2014/main" id="{CCC979CD-EB07-41E6-8A44-D292470CBEBC}"/>
-              </a:ext>
-            </a:extLst>
-          </p:cNvPr>
-          <p:cNvSpPr>
-            <a:spLocks noGrp="1"/>
-          </p:cNvSpPr>
-          <p:nvPr>
-            <p:ph type="ctrTitle"/>
-          </p:nvPr>
-        </p:nvSpPr>
-        <p:spPr/>
-        <p:txBody>
-          <a:bodyPr/>
-          <a:lstStyle/>
-          <a:p>
-            <a:endParaRPr lang="es-MX" dirty="0"/>
-          </a:p>
-        </p:txBody>
-      </p:sp>
-      <p:sp>
-        <p:nvSpPr>
-          <p:cNvPr id="3" name="Subtítulo 2">
-            <a:extLst>
-              <a:ext uri="{FF2B5EF4-FFF2-40B4-BE49-F238E27FC236}">
-                <a16:creationId xmlns:a16="http://schemas.microsoft.com/office/drawing/2014/main" id="{EE6A336A-7CC8-4CE0-96D5-FA97E93E395F}"/>
-              </a:ext>
-            </a:extLst>
-          </p:cNvPr>
-          <p:cNvSpPr>
-            <a:spLocks noGrp="1"/>
-          </p:cNvSpPr>
-          <p:nvPr>
-            <p:ph type="subTitle" idx="1"/>
-          </p:nvPr>
-        </p:nvSpPr>
-        <p:spPr/>
-        <p:txBody>
-          <a:bodyPr/>
-          <a:lstStyle/>
-          <a:p>
-            <a:endParaRPr lang="es-MX"/>
-          </a:p>
-        </p:txBody>
-      </p:sp>
-    </p:spTree>
-    <p:extLst>
-      <p:ext uri="{BB962C8B-B14F-4D97-AF65-F5344CB8AC3E}">
-        <p14:creationId xmlns:p14="http://schemas.microsoft.com/office/powerpoint/2010/main" val="1681134265"/>
-      </p:ext>
-    </p:extLst>
-  </p:cSld>
-  <p:clrMapOvr>
-    <a:masterClrMapping/>
-  </p:clrMapOvr>
-</p:sld>
-</file>
-
-<file path=ppt/slides/slide2.xml><?xml version="1.0" encoding="utf-8"?>
-<p:sld xmlns:a="http://schemas.openxmlformats.org/drawingml/2006/main" xmlns:r="http://schemas.openxmlformats.org/officeDocument/2006/relationships" xmlns:p="http://schemas.openxmlformats.org/presentationml/2006/main">
-  <p:cSld>
-    <p:spTree>
-      <p:nvGrpSpPr>
-        <p:cNvPr id="1" name=""/>
-        <p:cNvGrpSpPr/>
-        <p:nvPr/>
-      </p:nvGrpSpPr>
-      <p:grpSpPr>
-        <a:xfrm>
-          <a:off x="0" y="0"/>
-          <a:ext cx="0" cy="0"/>
-          <a:chOff x="0" y="0"/>
-          <a:chExt cx="0" cy="0"/>
-        </a:xfrm>
-      </p:grpSpPr>
-      <p:sp>
-        <p:nvSpPr>
-          <p:cNvPr id="2" name="Título 1"/>
-          <p:cNvSpPr>
-            <a:spLocks noGrp="1"/>
-          </p:cNvSpPr>
-          <p:nvPr>
-            <p:ph type="title"/>
-          </p:nvPr>
-        </p:nvSpPr>
-        <p:spPr/>
-        <p:txBody>
-          <a:bodyPr/>
-          <a:lstStyle/>
-          <a:p>
-            <a:r>
-              <a:rPr lang="es-MX" smtClean="0"/>
-              <a:t>Definición</a:t>
-            </a:r>
-            <a:endParaRPr lang="es-MX" dirty="0"/>
-          </a:p>
-        </p:txBody>
-      </p:sp>
-      <p:sp>
-        <p:nvSpPr>
-          <p:cNvPr id="3" name="Marcador de contenido 2"/>
-          <p:cNvSpPr>
-            <a:spLocks noGrp="1"/>
-          </p:cNvSpPr>
-          <p:nvPr>
-            <p:ph idx="1"/>
-          </p:nvPr>
-        </p:nvSpPr>
-        <p:spPr/>
-        <p:txBody>
-          <a:bodyPr/>
-          <a:lstStyle/>
-          <a:p>
-            <a:r>
-              <a:rPr lang="es-MX" dirty="0"/>
-              <a:t>Es una estructura dinámica de datos que contiene una colección de elementos homogéneos (del mismo tipo) de manera que se establece entre ellos un orden. Es decir, cada elemento, menos el primero, tiene un predecesor, y cada elemento, menos el último, tiene un </a:t>
-            </a:r>
-            <a:r>
-              <a:rPr lang="es-MX" dirty="0" smtClean="0"/>
-              <a:t>sucesor. Es </a:t>
-            </a:r>
-            <a:r>
-              <a:rPr lang="es-MX" dirty="0"/>
-              <a:t>una de las estructuras de datos fundamentales, y puede ser usada para implementar otras estructuras de datos. Consiste en una secuencia de nodos, en los que se guardan campos de datos arbitrarios y una o dos referencias, enlaces o punteros al nodo anterior o posterior.</a:t>
-            </a:r>
-          </a:p>
-          <a:p>
-            <a:endParaRPr lang="es-MX" dirty="0"/>
-          </a:p>
-        </p:txBody>
-      </p:sp>
-    </p:spTree>
-    <p:extLst>
-      <p:ext uri="{BB962C8B-B14F-4D97-AF65-F5344CB8AC3E}">
-        <p14:creationId xmlns:p14="http://schemas.microsoft.com/office/powerpoint/2010/main" val="2677230530"/>
-      </p:ext>
-    </p:extLst>
-  </p:cSld>
-  <p:clrMapOvr>
-    <a:masterClrMapping/>
-  </p:clrMapOvr>
-  <p:timing>
-    <p:tnLst>
-      <p:par>
-        <p:cTn id="1" dur="indefinite" restart="never" nodeType="tmRoot"/>
-      </p:par>
-    </p:tnLst>
-  </p:timing>
-</p:sld>
-</file>
-
-<file path=ppt/slides/slide3.xml><?xml version="1.0" encoding="utf-8"?>
-<p:sld xmlns:a="http://schemas.openxmlformats.org/drawingml/2006/main" xmlns:r="http://schemas.openxmlformats.org/officeDocument/2006/relationships" xmlns:p="http://schemas.openxmlformats.org/presentationml/2006/main">
-  <p:cSld>
     <p:bg>
       <p:bgPr>
-        <a:gradFill>
-          <a:gsLst>
-            <a:gs pos="0">
-              <a:schemeClr val="bg1"/>
-            </a:gs>
-            <a:gs pos="66000">
-              <a:schemeClr val="bg1">
-                <a:lumMod val="95000"/>
-              </a:schemeClr>
-            </a:gs>
-          </a:gsLst>
-          <a:lin ang="5400000" scaled="1"/>
-        </a:gradFill>
+        <a:solidFill>
+          <a:srgbClr val="0A0928"/>
+        </a:solidFill>
         <a:effectLst/>
       </p:bgPr>
     </p:bg>
@@ -3540,56 +3358,580 @@
           <a:chExt cx="0" cy="0"/>
         </a:xfrm>
       </p:grpSpPr>
-      <p:sp>
-        <p:nvSpPr>
-          <p:cNvPr id="5" name="Triángulo isósceles 4"/>
-          <p:cNvSpPr/>
+      <p:pic>
+        <p:nvPicPr>
+          <p:cNvPr id="1026" name="Picture 2" descr="Programación (lógica y creatividad))">
+            <a:extLst>
+              <a:ext uri="{FF2B5EF4-FFF2-40B4-BE49-F238E27FC236}">
+                <a16:creationId xmlns:a16="http://schemas.microsoft.com/office/drawing/2014/main" id="{A31B9F42-EE53-474F-859C-952DF09761AC}"/>
+              </a:ext>
+            </a:extLst>
+          </p:cNvPr>
+          <p:cNvPicPr>
+            <a:picLocks noChangeAspect="1" noChangeArrowheads="1"/>
+          </p:cNvPicPr>
           <p:nvPr/>
+        </p:nvPicPr>
+        <p:blipFill>
+          <a:blip r:embed="rId2">
+            <a:extLst>
+              <a:ext uri="{28A0092B-C50C-407E-A947-70E740481C1C}">
+                <a14:useLocalDpi xmlns:a14="http://schemas.microsoft.com/office/drawing/2010/main" val="0"/>
+              </a:ext>
+            </a:extLst>
+          </a:blip>
+          <a:srcRect/>
+          <a:stretch>
+            <a:fillRect/>
+          </a:stretch>
+        </p:blipFill>
+        <p:spPr bwMode="auto">
+          <a:xfrm>
+            <a:off x="0" y="0"/>
+            <a:ext cx="12858750" cy="6858000"/>
+          </a:xfrm>
+          <a:prstGeom prst="rect">
+            <a:avLst/>
+          </a:prstGeom>
+          <a:noFill/>
+          <a:extLst>
+            <a:ext uri="{909E8E84-426E-40DD-AFC4-6F175D3DCCD1}">
+              <a14:hiddenFill xmlns:a14="http://schemas.microsoft.com/office/drawing/2010/main">
+                <a:solidFill>
+                  <a:srgbClr val="FFFFFF"/>
+                </a:solidFill>
+              </a14:hiddenFill>
+            </a:ext>
+          </a:extLst>
+        </p:spPr>
+      </p:pic>
+      <p:sp>
+        <p:nvSpPr>
+          <p:cNvPr id="2" name="Título 1">
+            <a:extLst>
+              <a:ext uri="{FF2B5EF4-FFF2-40B4-BE49-F238E27FC236}">
+                <a16:creationId xmlns:a16="http://schemas.microsoft.com/office/drawing/2014/main" id="{CCC979CD-EB07-41E6-8A44-D292470CBEBC}"/>
+              </a:ext>
+            </a:extLst>
+          </p:cNvPr>
+          <p:cNvSpPr>
+            <a:spLocks noGrp="1"/>
+          </p:cNvSpPr>
+          <p:nvPr>
+            <p:ph type="ctrTitle"/>
+          </p:nvPr>
         </p:nvSpPr>
         <p:spPr>
-          <a:xfrm flipV="1">
-            <a:off x="4515729" y="-1"/>
-            <a:ext cx="7676272" cy="6858000"/>
+          <a:xfrm>
+            <a:off x="491544" y="1143509"/>
+            <a:ext cx="9144000" cy="2387600"/>
           </a:xfrm>
-          <a:prstGeom prst="triangle">
-            <a:avLst>
-              <a:gd name="adj" fmla="val 100000"/>
-            </a:avLst>
+        </p:spPr>
+        <p:txBody>
+          <a:bodyPr/>
+          <a:lstStyle/>
+          <a:p>
+            <a:pPr algn="just"/>
+            <a:r>
+              <a:rPr lang="es-MX" dirty="0">
+                <a:solidFill>
+                  <a:schemeClr val="bg1"/>
+                </a:solidFill>
+              </a:rPr>
+              <a:t>Estructuras de datos</a:t>
+            </a:r>
+          </a:p>
+        </p:txBody>
+      </p:sp>
+      <p:sp>
+        <p:nvSpPr>
+          <p:cNvPr id="3" name="Subtítulo 2">
+            <a:extLst>
+              <a:ext uri="{FF2B5EF4-FFF2-40B4-BE49-F238E27FC236}">
+                <a16:creationId xmlns:a16="http://schemas.microsoft.com/office/drawing/2014/main" id="{EE6A336A-7CC8-4CE0-96D5-FA97E93E395F}"/>
+              </a:ext>
+            </a:extLst>
+          </p:cNvPr>
+          <p:cNvSpPr>
+            <a:spLocks noGrp="1"/>
+          </p:cNvSpPr>
+          <p:nvPr>
+            <p:ph type="subTitle" idx="1"/>
+          </p:nvPr>
+        </p:nvSpPr>
+        <p:spPr>
+          <a:xfrm>
+            <a:off x="622478" y="3606152"/>
+            <a:ext cx="9144000" cy="377534"/>
+          </a:xfrm>
+        </p:spPr>
+        <p:txBody>
+          <a:bodyPr>
+            <a:normAutofit fontScale="92500" lnSpcReduction="10000"/>
+          </a:bodyPr>
+          <a:lstStyle/>
+          <a:p>
+            <a:pPr algn="just"/>
+            <a:r>
+              <a:rPr lang="es-MX" dirty="0">
+                <a:solidFill>
+                  <a:schemeClr val="bg1"/>
+                </a:solidFill>
+              </a:rPr>
+              <a:t>Listas</a:t>
+            </a:r>
+          </a:p>
+          <a:p>
+            <a:pPr algn="just"/>
+            <a:endParaRPr lang="es-MX" dirty="0">
+              <a:solidFill>
+                <a:schemeClr val="bg1"/>
+              </a:solidFill>
+            </a:endParaRPr>
+          </a:p>
+        </p:txBody>
+      </p:sp>
+      <p:sp>
+        <p:nvSpPr>
+          <p:cNvPr id="4" name="Subtítulo 2">
+            <a:extLst>
+              <a:ext uri="{FF2B5EF4-FFF2-40B4-BE49-F238E27FC236}">
+                <a16:creationId xmlns:a16="http://schemas.microsoft.com/office/drawing/2014/main" id="{21958052-2FA8-4259-9678-31CD2116C4E9}"/>
+              </a:ext>
+            </a:extLst>
+          </p:cNvPr>
+          <p:cNvSpPr txBox="1">
+            <a:spLocks/>
+          </p:cNvSpPr>
+          <p:nvPr/>
+        </p:nvSpPr>
+        <p:spPr>
+          <a:xfrm>
+            <a:off x="491544" y="4674617"/>
+            <a:ext cx="3088783" cy="1655762"/>
+          </a:xfrm>
+          <a:prstGeom prst="rect">
+            <a:avLst/>
           </a:prstGeom>
-          <a:solidFill>
-            <a:schemeClr val="bg1">
-              <a:lumMod val="95000"/>
-            </a:schemeClr>
-          </a:solidFill>
-          <a:ln>
-            <a:noFill/>
-          </a:ln>
         </p:spPr>
-        <p:style>
-          <a:lnRef idx="2">
-            <a:schemeClr val="accent1">
-              <a:shade val="50000"/>
-            </a:schemeClr>
-          </a:lnRef>
-          <a:fillRef idx="1">
-            <a:schemeClr val="accent1"/>
-          </a:fillRef>
-          <a:effectRef idx="0">
-            <a:schemeClr val="accent1"/>
-          </a:effectRef>
-          <a:fontRef idx="minor">
-            <a:schemeClr val="lt1"/>
-          </a:fontRef>
-        </p:style>
-        <p:txBody>
-          <a:bodyPr rtlCol="0" anchor="ctr"/>
-          <a:lstStyle/>
-          <a:p>
-            <a:pPr algn="ctr"/>
-            <a:endParaRPr lang="es-ES"/>
-          </a:p>
-        </p:txBody>
-      </p:sp>
+        <p:txBody>
+          <a:bodyPr vert="horz" lIns="91440" tIns="45720" rIns="91440" bIns="45720" rtlCol="0">
+            <a:normAutofit fontScale="92500" lnSpcReduction="10000"/>
+          </a:bodyPr>
+          <a:lstStyle>
+            <a:lvl1pPr marL="0" indent="0" algn="ctr" defTabSz="914400" rtl="0" eaLnBrk="1" latinLnBrk="0" hangingPunct="1">
+              <a:lnSpc>
+                <a:spcPct val="90000"/>
+              </a:lnSpc>
+              <a:spcBef>
+                <a:spcPts val="1000"/>
+              </a:spcBef>
+              <a:buFont typeface="Arial" panose="020B0604020202020204" pitchFamily="34" charset="0"/>
+              <a:buNone/>
+              <a:defRPr sz="2400" kern="1200">
+                <a:solidFill>
+                  <a:schemeClr val="tx1"/>
+                </a:solidFill>
+                <a:latin typeface="+mn-lt"/>
+                <a:ea typeface="+mn-ea"/>
+                <a:cs typeface="+mn-cs"/>
+              </a:defRPr>
+            </a:lvl1pPr>
+            <a:lvl2pPr marL="457200" indent="0" algn="ctr" defTabSz="914400" rtl="0" eaLnBrk="1" latinLnBrk="0" hangingPunct="1">
+              <a:lnSpc>
+                <a:spcPct val="90000"/>
+              </a:lnSpc>
+              <a:spcBef>
+                <a:spcPts val="500"/>
+              </a:spcBef>
+              <a:buFont typeface="Arial" panose="020B0604020202020204" pitchFamily="34" charset="0"/>
+              <a:buNone/>
+              <a:defRPr sz="2000" kern="1200">
+                <a:solidFill>
+                  <a:schemeClr val="tx1"/>
+                </a:solidFill>
+                <a:latin typeface="+mn-lt"/>
+                <a:ea typeface="+mn-ea"/>
+                <a:cs typeface="+mn-cs"/>
+              </a:defRPr>
+            </a:lvl2pPr>
+            <a:lvl3pPr marL="914400" indent="0" algn="ctr" defTabSz="914400" rtl="0" eaLnBrk="1" latinLnBrk="0" hangingPunct="1">
+              <a:lnSpc>
+                <a:spcPct val="90000"/>
+              </a:lnSpc>
+              <a:spcBef>
+                <a:spcPts val="500"/>
+              </a:spcBef>
+              <a:buFont typeface="Arial" panose="020B0604020202020204" pitchFamily="34" charset="0"/>
+              <a:buNone/>
+              <a:defRPr sz="1800" kern="1200">
+                <a:solidFill>
+                  <a:schemeClr val="tx1"/>
+                </a:solidFill>
+                <a:latin typeface="+mn-lt"/>
+                <a:ea typeface="+mn-ea"/>
+                <a:cs typeface="+mn-cs"/>
+              </a:defRPr>
+            </a:lvl3pPr>
+            <a:lvl4pPr marL="1371600" indent="0" algn="ctr" defTabSz="914400" rtl="0" eaLnBrk="1" latinLnBrk="0" hangingPunct="1">
+              <a:lnSpc>
+                <a:spcPct val="90000"/>
+              </a:lnSpc>
+              <a:spcBef>
+                <a:spcPts val="500"/>
+              </a:spcBef>
+              <a:buFont typeface="Arial" panose="020B0604020202020204" pitchFamily="34" charset="0"/>
+              <a:buNone/>
+              <a:defRPr sz="1600" kern="1200">
+                <a:solidFill>
+                  <a:schemeClr val="tx1"/>
+                </a:solidFill>
+                <a:latin typeface="+mn-lt"/>
+                <a:ea typeface="+mn-ea"/>
+                <a:cs typeface="+mn-cs"/>
+              </a:defRPr>
+            </a:lvl4pPr>
+            <a:lvl5pPr marL="1828800" indent="0" algn="ctr" defTabSz="914400" rtl="0" eaLnBrk="1" latinLnBrk="0" hangingPunct="1">
+              <a:lnSpc>
+                <a:spcPct val="90000"/>
+              </a:lnSpc>
+              <a:spcBef>
+                <a:spcPts val="500"/>
+              </a:spcBef>
+              <a:buFont typeface="Arial" panose="020B0604020202020204" pitchFamily="34" charset="0"/>
+              <a:buNone/>
+              <a:defRPr sz="1600" kern="1200">
+                <a:solidFill>
+                  <a:schemeClr val="tx1"/>
+                </a:solidFill>
+                <a:latin typeface="+mn-lt"/>
+                <a:ea typeface="+mn-ea"/>
+                <a:cs typeface="+mn-cs"/>
+              </a:defRPr>
+            </a:lvl5pPr>
+            <a:lvl6pPr marL="2286000" indent="0" algn="ctr" defTabSz="914400" rtl="0" eaLnBrk="1" latinLnBrk="0" hangingPunct="1">
+              <a:lnSpc>
+                <a:spcPct val="90000"/>
+              </a:lnSpc>
+              <a:spcBef>
+                <a:spcPts val="500"/>
+              </a:spcBef>
+              <a:buFont typeface="Arial" panose="020B0604020202020204" pitchFamily="34" charset="0"/>
+              <a:buNone/>
+              <a:defRPr sz="1600" kern="1200">
+                <a:solidFill>
+                  <a:schemeClr val="tx1"/>
+                </a:solidFill>
+                <a:latin typeface="+mn-lt"/>
+                <a:ea typeface="+mn-ea"/>
+                <a:cs typeface="+mn-cs"/>
+              </a:defRPr>
+            </a:lvl6pPr>
+            <a:lvl7pPr marL="2743200" indent="0" algn="ctr" defTabSz="914400" rtl="0" eaLnBrk="1" latinLnBrk="0" hangingPunct="1">
+              <a:lnSpc>
+                <a:spcPct val="90000"/>
+              </a:lnSpc>
+              <a:spcBef>
+                <a:spcPts val="500"/>
+              </a:spcBef>
+              <a:buFont typeface="Arial" panose="020B0604020202020204" pitchFamily="34" charset="0"/>
+              <a:buNone/>
+              <a:defRPr sz="1600" kern="1200">
+                <a:solidFill>
+                  <a:schemeClr val="tx1"/>
+                </a:solidFill>
+                <a:latin typeface="+mn-lt"/>
+                <a:ea typeface="+mn-ea"/>
+                <a:cs typeface="+mn-cs"/>
+              </a:defRPr>
+            </a:lvl7pPr>
+            <a:lvl8pPr marL="3200400" indent="0" algn="ctr" defTabSz="914400" rtl="0" eaLnBrk="1" latinLnBrk="0" hangingPunct="1">
+              <a:lnSpc>
+                <a:spcPct val="90000"/>
+              </a:lnSpc>
+              <a:spcBef>
+                <a:spcPts val="500"/>
+              </a:spcBef>
+              <a:buFont typeface="Arial" panose="020B0604020202020204" pitchFamily="34" charset="0"/>
+              <a:buNone/>
+              <a:defRPr sz="1600" kern="1200">
+                <a:solidFill>
+                  <a:schemeClr val="tx1"/>
+                </a:solidFill>
+                <a:latin typeface="+mn-lt"/>
+                <a:ea typeface="+mn-ea"/>
+                <a:cs typeface="+mn-cs"/>
+              </a:defRPr>
+            </a:lvl8pPr>
+            <a:lvl9pPr marL="3657600" indent="0" algn="ctr" defTabSz="914400" rtl="0" eaLnBrk="1" latinLnBrk="0" hangingPunct="1">
+              <a:lnSpc>
+                <a:spcPct val="90000"/>
+              </a:lnSpc>
+              <a:spcBef>
+                <a:spcPts val="500"/>
+              </a:spcBef>
+              <a:buFont typeface="Arial" panose="020B0604020202020204" pitchFamily="34" charset="0"/>
+              <a:buNone/>
+              <a:defRPr sz="1600" kern="1200">
+                <a:solidFill>
+                  <a:schemeClr val="tx1"/>
+                </a:solidFill>
+                <a:latin typeface="+mn-lt"/>
+                <a:ea typeface="+mn-ea"/>
+                <a:cs typeface="+mn-cs"/>
+              </a:defRPr>
+            </a:lvl9pPr>
+          </a:lstStyle>
+          <a:p>
+            <a:pPr algn="just"/>
+            <a:r>
+              <a:rPr lang="es-MX" sz="1400" dirty="0">
+                <a:solidFill>
+                  <a:schemeClr val="bg1"/>
+                </a:solidFill>
+              </a:rPr>
+              <a:t>Participantes: </a:t>
+            </a:r>
+          </a:p>
+          <a:p>
+            <a:pPr algn="just"/>
+            <a:endParaRPr lang="es-MX" sz="1400" dirty="0">
+              <a:solidFill>
+                <a:schemeClr val="bg1"/>
+              </a:solidFill>
+            </a:endParaRPr>
+          </a:p>
+          <a:p>
+            <a:pPr algn="just"/>
+            <a:r>
+              <a:rPr lang="es-MX" sz="1400" dirty="0">
+                <a:solidFill>
+                  <a:schemeClr val="bg1"/>
+                </a:solidFill>
+                <a:latin typeface="Roboto" panose="02000000000000000000" pitchFamily="2" charset="0"/>
+                <a:ea typeface="Roboto" panose="02000000000000000000" pitchFamily="2" charset="0"/>
+                <a:cs typeface="Roboto" panose="02000000000000000000" pitchFamily="2" charset="0"/>
+              </a:rPr>
+              <a:t>Romero Morales Gustavo Ismael</a:t>
+            </a:r>
+          </a:p>
+          <a:p>
+            <a:pPr algn="just"/>
+            <a:r>
+              <a:rPr lang="es-MX" sz="1400" dirty="0">
+                <a:solidFill>
+                  <a:schemeClr val="bg1"/>
+                </a:solidFill>
+                <a:latin typeface="Roboto" panose="02000000000000000000" pitchFamily="2" charset="0"/>
+                <a:ea typeface="Roboto" panose="02000000000000000000" pitchFamily="2" charset="0"/>
+                <a:cs typeface="Roboto" panose="02000000000000000000" pitchFamily="2" charset="0"/>
+              </a:rPr>
+              <a:t>Ramírez Zaragoza Emmanuel</a:t>
+            </a:r>
+          </a:p>
+          <a:p>
+            <a:pPr algn="just"/>
+            <a:r>
+              <a:rPr lang="es-MX" sz="1100" b="0" i="0" dirty="0">
+                <a:solidFill>
+                  <a:schemeClr val="bg1"/>
+                </a:solidFill>
+                <a:effectLst/>
+                <a:latin typeface="Roboto" panose="02000000000000000000" pitchFamily="2" charset="0"/>
+                <a:ea typeface="Roboto" panose="02000000000000000000" pitchFamily="2" charset="0"/>
+                <a:cs typeface="Roboto" panose="02000000000000000000" pitchFamily="2" charset="0"/>
+              </a:rPr>
+              <a:t>ZAMORA RODRIGUEZ CRISTOFER JESÚS</a:t>
+            </a:r>
+          </a:p>
+          <a:p>
+            <a:pPr algn="just"/>
+            <a:r>
+              <a:rPr lang="es-MX" sz="1100" b="0" i="0" dirty="0">
+                <a:solidFill>
+                  <a:schemeClr val="bg1"/>
+                </a:solidFill>
+                <a:effectLst/>
+                <a:latin typeface="Roboto" panose="02000000000000000000" pitchFamily="2" charset="0"/>
+              </a:rPr>
+              <a:t>VELAZQUEZ BOBADILLA GIBRAN ALEJANDRO</a:t>
+            </a:r>
+            <a:endParaRPr lang="es-MX" sz="1400" dirty="0">
+              <a:solidFill>
+                <a:schemeClr val="bg1"/>
+              </a:solidFill>
+              <a:latin typeface="Roboto" panose="02000000000000000000" pitchFamily="2" charset="0"/>
+              <a:ea typeface="Roboto" panose="02000000000000000000" pitchFamily="2" charset="0"/>
+              <a:cs typeface="Roboto" panose="02000000000000000000" pitchFamily="2" charset="0"/>
+            </a:endParaRPr>
+          </a:p>
+        </p:txBody>
+      </p:sp>
+    </p:spTree>
+    <p:extLst>
+      <p:ext uri="{BB962C8B-B14F-4D97-AF65-F5344CB8AC3E}">
+        <p14:creationId xmlns:p14="http://schemas.microsoft.com/office/powerpoint/2010/main" val="1681134265"/>
+      </p:ext>
+    </p:extLst>
+  </p:cSld>
+  <p:clrMapOvr>
+    <a:masterClrMapping/>
+  </p:clrMapOvr>
+  <mc:AlternateContent xmlns:mc="http://schemas.openxmlformats.org/markup-compatibility/2006">
+    <mc:Choice xmlns:p159="http://schemas.microsoft.com/office/powerpoint/2015/09/main" Requires="p159">
+      <p:transition xmlns:p14="http://schemas.microsoft.com/office/powerpoint/2010/main" spd="slow" p14:dur="2000">
+        <p159:morph option="byObject"/>
+      </p:transition>
+    </mc:Choice>
+    <mc:Fallback>
+      <p:transition spd="slow">
+        <p:fade/>
+      </p:transition>
+    </mc:Fallback>
+  </mc:AlternateContent>
+</p:sld>
+</file>
+
+<file path=ppt/slides/slide2.xml><?xml version="1.0" encoding="utf-8"?>
+<p:sld xmlns:a="http://schemas.openxmlformats.org/drawingml/2006/main" xmlns:r="http://schemas.openxmlformats.org/officeDocument/2006/relationships" xmlns:p="http://schemas.openxmlformats.org/presentationml/2006/main">
+  <p:cSld>
+    <p:bg>
+      <p:bgPr>
+        <a:solidFill>
+          <a:srgbClr val="0A0928"/>
+        </a:solidFill>
+        <a:effectLst/>
+      </p:bgPr>
+    </p:bg>
+    <p:spTree>
+      <p:nvGrpSpPr>
+        <p:cNvPr id="1" name=""/>
+        <p:cNvGrpSpPr/>
+        <p:nvPr/>
+      </p:nvGrpSpPr>
+      <p:grpSpPr>
+        <a:xfrm>
+          <a:off x="0" y="0"/>
+          <a:ext cx="0" cy="0"/>
+          <a:chOff x="0" y="0"/>
+          <a:chExt cx="0" cy="0"/>
+        </a:xfrm>
+      </p:grpSpPr>
+      <p:sp>
+        <p:nvSpPr>
+          <p:cNvPr id="2" name="Título 1"/>
+          <p:cNvSpPr>
+            <a:spLocks noGrp="1"/>
+          </p:cNvSpPr>
+          <p:nvPr>
+            <p:ph type="title"/>
+          </p:nvPr>
+        </p:nvSpPr>
+        <p:spPr>
+          <a:xfrm>
+            <a:off x="941230" y="1562861"/>
+            <a:ext cx="2767886" cy="1325563"/>
+          </a:xfrm>
+        </p:spPr>
+        <p:txBody>
+          <a:bodyPr/>
+          <a:lstStyle/>
+          <a:p>
+            <a:r>
+              <a:rPr lang="es-MX" b="1" dirty="0">
+                <a:solidFill>
+                  <a:schemeClr val="bg1"/>
+                </a:solidFill>
+              </a:rPr>
+              <a:t>Definición</a:t>
+            </a:r>
+          </a:p>
+        </p:txBody>
+      </p:sp>
+      <p:sp>
+        <p:nvSpPr>
+          <p:cNvPr id="3" name="Marcador de contenido 2"/>
+          <p:cNvSpPr>
+            <a:spLocks noGrp="1"/>
+          </p:cNvSpPr>
+          <p:nvPr>
+            <p:ph idx="1"/>
+          </p:nvPr>
+        </p:nvSpPr>
+        <p:spPr>
+          <a:xfrm>
+            <a:off x="941230" y="3063573"/>
+            <a:ext cx="8318680" cy="2000944"/>
+          </a:xfrm>
+        </p:spPr>
+        <p:txBody>
+          <a:bodyPr>
+            <a:normAutofit/>
+          </a:bodyPr>
+          <a:lstStyle/>
+          <a:p>
+            <a:pPr marL="0" indent="0">
+              <a:buNone/>
+            </a:pPr>
+            <a:r>
+              <a:rPr lang="es-MX" sz="1800" dirty="0">
+                <a:solidFill>
+                  <a:schemeClr val="bg1"/>
+                </a:solidFill>
+              </a:rPr>
+              <a:t>Es una estructura dinámica de datos que contiene una colección de elementos homogéneos (del mismo tipo) de manera que se establece entre ellos un orden. Es decir, cada elemento, menos el primero, tiene un predecesor, y cada elemento, menos el último, tiene un sucesor. Es una de las estructuras de datos fundamentales, y puede ser usada para implementar otras estructuras de datos. Consiste en una secuencia de nodos, en los que se guardan campos de datos arbitrarios y una o dos referencias, enlaces o punteros al nodo anterior o posterior.</a:t>
+            </a:r>
+          </a:p>
+          <a:p>
+            <a:endParaRPr lang="es-MX" sz="1800" dirty="0">
+              <a:solidFill>
+                <a:schemeClr val="bg1"/>
+              </a:solidFill>
+            </a:endParaRPr>
+          </a:p>
+        </p:txBody>
+      </p:sp>
+    </p:spTree>
+    <p:extLst>
+      <p:ext uri="{BB962C8B-B14F-4D97-AF65-F5344CB8AC3E}">
+        <p14:creationId xmlns:p14="http://schemas.microsoft.com/office/powerpoint/2010/main" val="2677230530"/>
+      </p:ext>
+    </p:extLst>
+  </p:cSld>
+  <p:clrMapOvr>
+    <a:masterClrMapping/>
+  </p:clrMapOvr>
+  <p:transition spd="slow">
+    <p:push dir="u"/>
+  </p:transition>
+</p:sld>
+</file>
+
+<file path=ppt/slides/slide3.xml><?xml version="1.0" encoding="utf-8"?>
+<p:sld xmlns:a="http://schemas.openxmlformats.org/drawingml/2006/main" xmlns:r="http://schemas.openxmlformats.org/officeDocument/2006/relationships" xmlns:p="http://schemas.openxmlformats.org/presentationml/2006/main">
+  <p:cSld>
+    <p:bg>
+      <p:bgPr>
+        <a:solidFill>
+          <a:srgbClr val="0A0928"/>
+        </a:solidFill>
+        <a:effectLst/>
+      </p:bgPr>
+    </p:bg>
+    <p:spTree>
+      <p:nvGrpSpPr>
+        <p:cNvPr id="1" name=""/>
+        <p:cNvGrpSpPr/>
+        <p:nvPr/>
+      </p:nvGrpSpPr>
+      <p:grpSpPr>
+        <a:xfrm>
+          <a:off x="0" y="0"/>
+          <a:ext cx="0" cy="0"/>
+          <a:chOff x="0" y="0"/>
+          <a:chExt cx="0" cy="0"/>
+        </a:xfrm>
+      </p:grpSpPr>
       <p:sp>
         <p:nvSpPr>
           <p:cNvPr id="4" name="Triángulo isósceles 3"/>
@@ -3607,10 +3949,7 @@
             </a:avLst>
           </a:prstGeom>
           <a:solidFill>
-            <a:schemeClr val="accent1">
-              <a:lumMod val="20000"/>
-              <a:lumOff val="80000"/>
-            </a:schemeClr>
+            <a:srgbClr val="141252"/>
           </a:solidFill>
           <a:ln>
             <a:noFill/>
@@ -3650,8 +3989,8 @@
         </p:nvSpPr>
         <p:spPr>
           <a:xfrm>
-            <a:off x="352814" y="316334"/>
-            <a:ext cx="2752677" cy="461665"/>
+            <a:off x="428765" y="617249"/>
+            <a:ext cx="2598788" cy="461665"/>
           </a:xfrm>
           <a:prstGeom prst="rect">
             <a:avLst/>
@@ -3664,12 +4003,15 @@
           <a:lstStyle/>
           <a:p>
             <a:r>
-              <a:rPr lang="es-ES" sz="2400" b="1" dirty="0" smtClean="0">
+              <a:rPr lang="es-ES" sz="2400" b="1" dirty="0">
+                <a:solidFill>
+                  <a:schemeClr val="bg1"/>
+                </a:solidFill>
                 <a:latin typeface="Century Gothic" panose="020B0502020202020204" pitchFamily="34" charset="0"/>
                 <a:ea typeface="Calibri" panose="020F0502020204030204" pitchFamily="34" charset="0"/>
                 <a:cs typeface="Times New Roman" panose="02020603050405020304" pitchFamily="18" charset="0"/>
               </a:rPr>
-              <a:t>Características. –</a:t>
+              <a:t>Características. </a:t>
             </a:r>
           </a:p>
         </p:txBody>
@@ -3682,8 +4024,8 @@
         </p:nvSpPr>
         <p:spPr>
           <a:xfrm>
-            <a:off x="352814" y="974947"/>
-            <a:ext cx="10911840" cy="4339650"/>
+            <a:off x="428765" y="1502211"/>
+            <a:ext cx="5778852" cy="4924425"/>
           </a:xfrm>
           <a:prstGeom prst="rect">
             <a:avLst/>
@@ -3699,21 +4041,19 @@
             <a:pPr lvl="0"/>
             <a:r>
               <a:rPr lang="es-ES" sz="2000" dirty="0">
-                <a:latin typeface="Century Gothic" panose="020B0502020202020204" pitchFamily="34" charset="0"/>
+                <a:solidFill>
+                  <a:schemeClr val="bg1"/>
+                </a:solidFill>
               </a:rPr>
-              <a:t>Una lista es una colección de elementos llamados generalmente nodos, se relacionan por punteros o direcciones a </a:t>
-            </a:r>
-            <a:r>
-              <a:rPr lang="es-ES" sz="2000" dirty="0" smtClean="0">
-                <a:latin typeface="Century Gothic" panose="020B0502020202020204" pitchFamily="34" charset="0"/>
-              </a:rPr>
-              <a:t>otros nodos.</a:t>
+              <a:t>Una lista es una colección de elementos llamados generalmente nodos, se relacionan por punteros o direcciones a otros nodos.</a:t>
             </a:r>
           </a:p>
           <a:p>
             <a:pPr lvl="0"/>
-            <a:endParaRPr lang="es-ES" sz="2000" dirty="0" smtClean="0">
-              <a:latin typeface="Century Gothic" panose="020B0502020202020204" pitchFamily="34" charset="0"/>
+            <a:endParaRPr lang="es-ES" sz="2000" dirty="0">
+              <a:solidFill>
+                <a:schemeClr val="bg1"/>
+              </a:solidFill>
             </a:endParaRPr>
           </a:p>
           <a:p>
@@ -3722,8 +4062,10 @@
               <a:buChar char="•"/>
             </a:pPr>
             <a:r>
-              <a:rPr lang="es-ES" dirty="0" smtClean="0">
-                <a:latin typeface="Century Gothic" panose="020B0502020202020204" pitchFamily="34" charset="0"/>
+              <a:rPr lang="es-ES" dirty="0">
+                <a:solidFill>
+                  <a:schemeClr val="bg1"/>
+                </a:solidFill>
               </a:rPr>
               <a:t>Las listas aprueban inserciones y eliminación de nodos en cualquier punto de la lista en tiempo constante, pero no permiten un acceso aleatorio.</a:t>
             </a:r>
@@ -3733,36 +4075,11 @@
               <a:buFont typeface="Arial" panose="020B0604020202020204" pitchFamily="34" charset="0"/>
               <a:buChar char="•"/>
             </a:pPr>
-            <a:r>
-              <a:rPr lang="es-ES" dirty="0" smtClean="0">
-                <a:latin typeface="Century Gothic" panose="020B0502020202020204" pitchFamily="34" charset="0"/>
-              </a:rPr>
-              <a:t>Pueden ser implementadas en muchos lenguajes, lenguajes tales como </a:t>
-            </a:r>
-            <a:r>
-              <a:rPr lang="es-ES" dirty="0" err="1" smtClean="0">
-                <a:latin typeface="Century Gothic" panose="020B0502020202020204" pitchFamily="34" charset="0"/>
-              </a:rPr>
-              <a:t>Lisp</a:t>
-            </a:r>
-            <a:r>
-              <a:rPr lang="es-ES" dirty="0" smtClean="0">
-                <a:latin typeface="Century Gothic" panose="020B0502020202020204" pitchFamily="34" charset="0"/>
-              </a:rPr>
-              <a:t> y </a:t>
-            </a:r>
-            <a:r>
-              <a:rPr lang="es-ES" dirty="0" err="1" smtClean="0">
-                <a:latin typeface="Century Gothic" panose="020B0502020202020204" pitchFamily="34" charset="0"/>
-              </a:rPr>
-              <a:t>Scheme</a:t>
-            </a:r>
-            <a:r>
-              <a:rPr lang="es-ES" dirty="0" smtClean="0">
-                <a:latin typeface="Century Gothic" panose="020B0502020202020204" pitchFamily="34" charset="0"/>
-              </a:rPr>
-              <a:t> tiene estructuras de datos ya construidas, junto con operaciones para acceder a las listas enlazadas. Lenguaje imperativos u orientados a objetos tales como C o C++ y Java, respectiva, disponen de referencias para crear lisas enlazadas. </a:t>
-            </a:r>
+            <a:endParaRPr lang="es-ES" dirty="0">
+              <a:solidFill>
+                <a:schemeClr val="bg1"/>
+              </a:solidFill>
+            </a:endParaRPr>
           </a:p>
           <a:p>
             <a:pPr marL="285750" lvl="0" indent="-285750">
@@ -3770,11 +4087,53 @@
               <a:buChar char="•"/>
             </a:pPr>
             <a:r>
-              <a:rPr lang="es-ES" dirty="0" smtClean="0">
-                <a:latin typeface="Century Gothic" panose="020B0502020202020204" pitchFamily="34" charset="0"/>
+              <a:rPr lang="es-ES" dirty="0">
+                <a:solidFill>
+                  <a:schemeClr val="bg1"/>
+                </a:solidFill>
               </a:rPr>
-              <a:t>Todos los elementos de la lista son del mismo tipo. </a:t>
-            </a:r>
+              <a:t>Pueden ser implementadas en muchos lenguajes, lenguajes tales como </a:t>
+            </a:r>
+            <a:r>
+              <a:rPr lang="es-ES" dirty="0" err="1">
+                <a:solidFill>
+                  <a:schemeClr val="bg1"/>
+                </a:solidFill>
+              </a:rPr>
+              <a:t>Lisp</a:t>
+            </a:r>
+            <a:r>
+              <a:rPr lang="es-ES" dirty="0">
+                <a:solidFill>
+                  <a:schemeClr val="bg1"/>
+                </a:solidFill>
+              </a:rPr>
+              <a:t> y </a:t>
+            </a:r>
+            <a:r>
+              <a:rPr lang="es-ES" dirty="0" err="1">
+                <a:solidFill>
+                  <a:schemeClr val="bg1"/>
+                </a:solidFill>
+              </a:rPr>
+              <a:t>Scheme</a:t>
+            </a:r>
+            <a:r>
+              <a:rPr lang="es-ES" dirty="0">
+                <a:solidFill>
+                  <a:schemeClr val="bg1"/>
+                </a:solidFill>
+              </a:rPr>
+              <a:t> tiene estructuras de datos ya construidas, junto con operaciones para acceder a las listas enlazadas. Lenguaje imperativos u orientados a objetos tales como C o C++ y Java, respectiva, disponen de referencias para crear lisas enlazadas. </a:t>
+            </a:r>
+          </a:p>
+          <a:p>
+            <a:pPr lvl="0"/>
+            <a:endParaRPr lang="es-ES" dirty="0">
+              <a:solidFill>
+                <a:schemeClr val="bg1"/>
+              </a:solidFill>
+            </a:endParaRPr>
           </a:p>
           <a:p>
             <a:pPr marL="285750" lvl="0" indent="-285750">
@@ -3782,22 +4141,55 @@
               <a:buChar char="•"/>
             </a:pPr>
             <a:r>
-              <a:rPr lang="es-ES" dirty="0" smtClean="0">
-                <a:latin typeface="Century Gothic" panose="020B0502020202020204" pitchFamily="34" charset="0"/>
+              <a:rPr lang="es-ES" dirty="0">
+                <a:solidFill>
+                  <a:schemeClr val="bg1"/>
+                </a:solidFill>
               </a:rPr>
-              <a:t>Existe un orden en los elementos, ya que es una estructura lineal, pero los elementos no están ordenados por su valor sino por la posición en que se han insertado.</a:t>
-            </a:r>
-          </a:p>
+              <a:t>Todos los elementos de la lista son del mismo tipo. </a:t>
+            </a:r>
+          </a:p>
+        </p:txBody>
+      </p:sp>
+      <p:sp>
+        <p:nvSpPr>
+          <p:cNvPr id="7" name="CuadroTexto 6">
+            <a:extLst>
+              <a:ext uri="{FF2B5EF4-FFF2-40B4-BE49-F238E27FC236}">
+                <a16:creationId xmlns:a16="http://schemas.microsoft.com/office/drawing/2014/main" id="{F482D9AC-0886-4F8A-91D0-D2EEE57AFBA3}"/>
+              </a:ext>
+            </a:extLst>
+          </p:cNvPr>
+          <p:cNvSpPr txBox="1"/>
+          <p:nvPr/>
+        </p:nvSpPr>
+        <p:spPr>
+          <a:xfrm>
+            <a:off x="6207617" y="1502211"/>
+            <a:ext cx="6098146" cy="2585323"/>
+          </a:xfrm>
+          <a:prstGeom prst="rect">
+            <a:avLst/>
+          </a:prstGeom>
+          <a:noFill/>
+        </p:spPr>
+        <p:txBody>
+          <a:bodyPr wrap="square">
+            <a:spAutoFit/>
+          </a:bodyPr>
+          <a:lstStyle/>
           <a:p>
             <a:pPr marL="285750" lvl="0" indent="-285750">
               <a:buFont typeface="Arial" panose="020B0604020202020204" pitchFamily="34" charset="0"/>
               <a:buChar char="•"/>
             </a:pPr>
             <a:r>
-              <a:rPr lang="es-ES" dirty="0" smtClean="0">
-                <a:latin typeface="Century Gothic" panose="020B0502020202020204" pitchFamily="34" charset="0"/>
+              <a:rPr lang="es-ES" dirty="0">
+                <a:solidFill>
+                  <a:schemeClr val="bg1"/>
+                </a:solidFill>
               </a:rPr>
-              <a:t>Para cada elemento existe un anterior y un siguiente, excepto para el primero, que no tiene anterior, y para el último, que no tiene siguiente.</a:t>
+              <a:t>Existe un orden en los elementos, ya que es una estructura lineal, pero los elementos no están ordenados por su valor sino por la posición en que se han insertado.</a:t>
             </a:r>
           </a:p>
           <a:p>
@@ -3805,15 +4197,50 @@
               <a:buFont typeface="Arial" panose="020B0604020202020204" pitchFamily="34" charset="0"/>
               <a:buChar char="•"/>
             </a:pPr>
-            <a:r>
-              <a:rPr lang="es-ES" dirty="0" smtClean="0">
-                <a:latin typeface="Century Gothic" panose="020B0502020202020204" pitchFamily="34" charset="0"/>
+            <a:endParaRPr lang="es-ES" dirty="0">
+              <a:solidFill>
+                <a:schemeClr val="bg1"/>
+              </a:solidFill>
+            </a:endParaRPr>
+          </a:p>
+          <a:p>
+            <a:pPr marL="285750" lvl="0" indent="-285750">
+              <a:buFont typeface="Arial" panose="020B0604020202020204" pitchFamily="34" charset="0"/>
+              <a:buChar char="•"/>
+            </a:pPr>
+            <a:r>
+              <a:rPr lang="es-ES" dirty="0">
+                <a:solidFill>
+                  <a:schemeClr val="bg1"/>
+                </a:solidFill>
+              </a:rPr>
+              <a:t>Para cada elemento existe un anterior y un siguiente, excepto para el primero, que no tiene anterior, y para el último, que no tiene siguiente.</a:t>
+            </a:r>
+          </a:p>
+          <a:p>
+            <a:pPr marL="285750" lvl="0" indent="-285750">
+              <a:buFont typeface="Arial" panose="020B0604020202020204" pitchFamily="34" charset="0"/>
+              <a:buChar char="•"/>
+            </a:pPr>
+            <a:endParaRPr lang="es-ES" dirty="0">
+              <a:solidFill>
+                <a:schemeClr val="bg1"/>
+              </a:solidFill>
+            </a:endParaRPr>
+          </a:p>
+          <a:p>
+            <a:pPr marL="285750" lvl="0" indent="-285750">
+              <a:buFont typeface="Arial" panose="020B0604020202020204" pitchFamily="34" charset="0"/>
+              <a:buChar char="•"/>
+            </a:pPr>
+            <a:r>
+              <a:rPr lang="es-ES" dirty="0">
+                <a:solidFill>
+                  <a:schemeClr val="bg1"/>
+                </a:solidFill>
               </a:rPr>
               <a:t>Se puede acceder y eliminar cualquier elemento. </a:t>
             </a:r>
-            <a:endParaRPr lang="es-ES" dirty="0">
-              <a:latin typeface="Century Gothic" panose="020B0502020202020204" pitchFamily="34" charset="0"/>
-            </a:endParaRPr>
           </a:p>
         </p:txBody>
       </p:sp>
@@ -3827,13 +4254,445 @@
   <p:clrMapOvr>
     <a:masterClrMapping/>
   </p:clrMapOvr>
-  <p:timing>
-    <p:tnLst>
-      <p:par>
-        <p:cTn id="1" dur="indefinite" restart="never" nodeType="tmRoot"/>
-      </p:par>
-    </p:tnLst>
-  </p:timing>
+  <mc:AlternateContent xmlns:mc="http://schemas.openxmlformats.org/markup-compatibility/2006">
+    <mc:Choice xmlns:p159="http://schemas.microsoft.com/office/powerpoint/2015/09/main" Requires="p159">
+      <p:transition xmlns:p14="http://schemas.microsoft.com/office/powerpoint/2010/main" spd="slow" p14:dur="2000">
+        <p159:morph option="byObject"/>
+      </p:transition>
+    </mc:Choice>
+    <mc:Fallback>
+      <p:transition spd="slow">
+        <p:fade/>
+      </p:transition>
+    </mc:Fallback>
+  </mc:AlternateContent>
+</p:sld>
+</file>
+
+<file path=ppt/slides/slide4.xml><?xml version="1.0" encoding="utf-8"?>
+<p:sld xmlns:a="http://schemas.openxmlformats.org/drawingml/2006/main" xmlns:r="http://schemas.openxmlformats.org/officeDocument/2006/relationships" xmlns:p="http://schemas.openxmlformats.org/presentationml/2006/main">
+  <p:cSld>
+    <p:bg>
+      <p:bgPr>
+        <a:solidFill>
+          <a:srgbClr val="0A0928"/>
+        </a:solidFill>
+        <a:effectLst/>
+      </p:bgPr>
+    </p:bg>
+    <p:spTree>
+      <p:nvGrpSpPr>
+        <p:cNvPr id="1" name=""/>
+        <p:cNvGrpSpPr/>
+        <p:nvPr/>
+      </p:nvGrpSpPr>
+      <p:grpSpPr>
+        <a:xfrm>
+          <a:off x="0" y="0"/>
+          <a:ext cx="0" cy="0"/>
+          <a:chOff x="0" y="0"/>
+          <a:chExt cx="0" cy="0"/>
+        </a:xfrm>
+      </p:grpSpPr>
+      <p:pic>
+        <p:nvPicPr>
+          <p:cNvPr id="10" name="Picture 2" descr="Programación (lógica y creatividad))">
+            <a:extLst>
+              <a:ext uri="{FF2B5EF4-FFF2-40B4-BE49-F238E27FC236}">
+                <a16:creationId xmlns:a16="http://schemas.microsoft.com/office/drawing/2014/main" id="{6102F3EC-7B40-4715-A5FF-469B216266E7}"/>
+              </a:ext>
+            </a:extLst>
+          </p:cNvPr>
+          <p:cNvPicPr>
+            <a:picLocks noChangeAspect="1" noChangeArrowheads="1"/>
+          </p:cNvPicPr>
+          <p:nvPr/>
+        </p:nvPicPr>
+        <p:blipFill rotWithShape="1">
+          <a:blip r:embed="rId2">
+            <a:extLst>
+              <a:ext uri="{28A0092B-C50C-407E-A947-70E740481C1C}">
+                <a14:useLocalDpi xmlns:a14="http://schemas.microsoft.com/office/drawing/2010/main" val="0"/>
+              </a:ext>
+            </a:extLst>
+          </a:blip>
+          <a:srcRect r="34631"/>
+          <a:stretch/>
+        </p:blipFill>
+        <p:spPr bwMode="auto">
+          <a:xfrm>
+            <a:off x="3786386" y="0"/>
+            <a:ext cx="8405614" cy="6858000"/>
+          </a:xfrm>
+          <a:prstGeom prst="rect">
+            <a:avLst/>
+          </a:prstGeom>
+          <a:noFill/>
+          <a:extLst>
+            <a:ext uri="{909E8E84-426E-40DD-AFC4-6F175D3DCCD1}">
+              <a14:hiddenFill xmlns:a14="http://schemas.microsoft.com/office/drawing/2010/main">
+                <a:solidFill>
+                  <a:srgbClr val="FFFFFF"/>
+                </a:solidFill>
+              </a14:hiddenFill>
+            </a:ext>
+          </a:extLst>
+        </p:spPr>
+      </p:pic>
+      <p:sp>
+        <p:nvSpPr>
+          <p:cNvPr id="2" name="CuadroTexto 1">
+            <a:extLst>
+              <a:ext uri="{FF2B5EF4-FFF2-40B4-BE49-F238E27FC236}">
+                <a16:creationId xmlns:a16="http://schemas.microsoft.com/office/drawing/2014/main" id="{7C4AD0E2-A8E1-4057-AEB6-A34959AFE323}"/>
+              </a:ext>
+            </a:extLst>
+          </p:cNvPr>
+          <p:cNvSpPr txBox="1"/>
+          <p:nvPr/>
+        </p:nvSpPr>
+        <p:spPr>
+          <a:xfrm>
+            <a:off x="554863" y="736606"/>
+            <a:ext cx="3335629" cy="523220"/>
+          </a:xfrm>
+          <a:prstGeom prst="rect">
+            <a:avLst/>
+          </a:prstGeom>
+          <a:noFill/>
+        </p:spPr>
+        <p:txBody>
+          <a:bodyPr wrap="square" rtlCol="0">
+            <a:spAutoFit/>
+          </a:bodyPr>
+          <a:lstStyle/>
+          <a:p>
+            <a:r>
+              <a:rPr lang="es-MX" sz="2800" b="1" dirty="0">
+                <a:solidFill>
+                  <a:schemeClr val="bg1"/>
+                </a:solidFill>
+              </a:rPr>
+              <a:t>Aplicaciones y usos </a:t>
+            </a:r>
+          </a:p>
+        </p:txBody>
+      </p:sp>
+      <p:sp>
+        <p:nvSpPr>
+          <p:cNvPr id="3" name="CuadroTexto 2">
+            <a:extLst>
+              <a:ext uri="{FF2B5EF4-FFF2-40B4-BE49-F238E27FC236}">
+                <a16:creationId xmlns:a16="http://schemas.microsoft.com/office/drawing/2014/main" id="{01F67C0E-9576-4A91-BCF6-A23A181B9D46}"/>
+              </a:ext>
+            </a:extLst>
+          </p:cNvPr>
+          <p:cNvSpPr txBox="1"/>
+          <p:nvPr/>
+        </p:nvSpPr>
+        <p:spPr>
+          <a:xfrm>
+            <a:off x="554864" y="1464159"/>
+            <a:ext cx="5602312" cy="1477328"/>
+          </a:xfrm>
+          <a:prstGeom prst="rect">
+            <a:avLst/>
+          </a:prstGeom>
+          <a:noFill/>
+        </p:spPr>
+        <p:txBody>
+          <a:bodyPr wrap="square" rtlCol="0">
+            <a:spAutoFit/>
+          </a:bodyPr>
+          <a:lstStyle/>
+          <a:p>
+            <a:r>
+              <a:rPr lang="es-MX" dirty="0">
+                <a:solidFill>
+                  <a:schemeClr val="bg1"/>
+                </a:solidFill>
+              </a:rPr>
+              <a:t>El uso y aplicaciones que tienen estas estructuras de datos son muy amplias, tanto así que según el tipo de lista que usemos serán las aplicaciones a efectuar. A modo general podemos desglosar los siguientes usos y aplicaciones.</a:t>
+            </a:r>
+          </a:p>
+        </p:txBody>
+      </p:sp>
+      <p:sp>
+        <p:nvSpPr>
+          <p:cNvPr id="5" name="CuadroTexto 4">
+            <a:extLst>
+              <a:ext uri="{FF2B5EF4-FFF2-40B4-BE49-F238E27FC236}">
+                <a16:creationId xmlns:a16="http://schemas.microsoft.com/office/drawing/2014/main" id="{DA98A6B8-0DC6-45F2-B652-B3AAF1015E48}"/>
+              </a:ext>
+            </a:extLst>
+          </p:cNvPr>
+          <p:cNvSpPr txBox="1"/>
+          <p:nvPr/>
+        </p:nvSpPr>
+        <p:spPr>
+          <a:xfrm>
+            <a:off x="605305" y="3675778"/>
+            <a:ext cx="6362163" cy="1200329"/>
+          </a:xfrm>
+          <a:prstGeom prst="rect">
+            <a:avLst/>
+          </a:prstGeom>
+          <a:noFill/>
+        </p:spPr>
+        <p:txBody>
+          <a:bodyPr wrap="square" rtlCol="0">
+            <a:spAutoFit/>
+          </a:bodyPr>
+          <a:lstStyle/>
+          <a:p>
+            <a:r>
+              <a:rPr lang="es-MX" dirty="0">
+                <a:solidFill>
+                  <a:schemeClr val="bg1"/>
+                </a:solidFill>
+              </a:rPr>
+              <a:t>Listas sencillas:</a:t>
+            </a:r>
+          </a:p>
+          <a:p>
+            <a:pPr marL="285750" indent="-285750">
+              <a:buFont typeface="Arial" panose="020B0604020202020204" pitchFamily="34" charset="0"/>
+              <a:buChar char="•"/>
+            </a:pPr>
+            <a:r>
+              <a:rPr lang="es-MX" dirty="0">
+                <a:solidFill>
+                  <a:schemeClr val="bg1"/>
+                </a:solidFill>
+              </a:rPr>
+              <a:t>Cronogramas de actividades </a:t>
+            </a:r>
+          </a:p>
+          <a:p>
+            <a:pPr marL="285750" indent="-285750">
+              <a:buFont typeface="Arial" panose="020B0604020202020204" pitchFamily="34" charset="0"/>
+              <a:buChar char="•"/>
+            </a:pPr>
+            <a:r>
+              <a:rPr lang="es-MX" dirty="0">
+                <a:solidFill>
+                  <a:schemeClr val="bg1"/>
+                </a:solidFill>
+              </a:rPr>
+              <a:t>Hallar elementos de una fila de personas</a:t>
+            </a:r>
+          </a:p>
+          <a:p>
+            <a:pPr marL="285750" indent="-285750">
+              <a:buFont typeface="Arial" panose="020B0604020202020204" pitchFamily="34" charset="0"/>
+              <a:buChar char="•"/>
+            </a:pPr>
+            <a:r>
+              <a:rPr lang="es-MX" dirty="0">
+                <a:solidFill>
+                  <a:schemeClr val="bg1"/>
+                </a:solidFill>
+              </a:rPr>
+              <a:t>Listas de compras</a:t>
+            </a:r>
+          </a:p>
+        </p:txBody>
+      </p:sp>
+      <p:sp>
+        <p:nvSpPr>
+          <p:cNvPr id="7" name="CuadroTexto 6">
+            <a:extLst>
+              <a:ext uri="{FF2B5EF4-FFF2-40B4-BE49-F238E27FC236}">
+                <a16:creationId xmlns:a16="http://schemas.microsoft.com/office/drawing/2014/main" id="{4A79BCC6-D2DF-4A84-8F95-E251EFEAAD54}"/>
+              </a:ext>
+            </a:extLst>
+          </p:cNvPr>
+          <p:cNvSpPr txBox="1"/>
+          <p:nvPr/>
+        </p:nvSpPr>
+        <p:spPr>
+          <a:xfrm>
+            <a:off x="605305" y="5073702"/>
+            <a:ext cx="6362163" cy="1200329"/>
+          </a:xfrm>
+          <a:prstGeom prst="rect">
+            <a:avLst/>
+          </a:prstGeom>
+          <a:noFill/>
+        </p:spPr>
+        <p:txBody>
+          <a:bodyPr wrap="square" rtlCol="0">
+            <a:spAutoFit/>
+          </a:bodyPr>
+          <a:lstStyle/>
+          <a:p>
+            <a:r>
+              <a:rPr lang="es-MX" dirty="0">
+                <a:solidFill>
+                  <a:schemeClr val="bg1"/>
+                </a:solidFill>
+              </a:rPr>
+              <a:t>Listas dobles:</a:t>
+            </a:r>
+          </a:p>
+          <a:p>
+            <a:pPr marL="285750" indent="-285750">
+              <a:buFont typeface="Arial" panose="020B0604020202020204" pitchFamily="34" charset="0"/>
+              <a:buChar char="•"/>
+            </a:pPr>
+            <a:r>
+              <a:rPr lang="es-MX" dirty="0">
+                <a:solidFill>
+                  <a:schemeClr val="bg1"/>
+                </a:solidFill>
+              </a:rPr>
+              <a:t>Medidor de combustible de un carro</a:t>
+            </a:r>
+          </a:p>
+          <a:p>
+            <a:pPr marL="285750" indent="-285750">
+              <a:buFont typeface="Arial" panose="020B0604020202020204" pitchFamily="34" charset="0"/>
+              <a:buChar char="•"/>
+            </a:pPr>
+            <a:r>
+              <a:rPr lang="es-MX" dirty="0">
+                <a:solidFill>
+                  <a:schemeClr val="bg1"/>
+                </a:solidFill>
+              </a:rPr>
+              <a:t>Almacenar información para un carrusel de imágenes</a:t>
+            </a:r>
+          </a:p>
+          <a:p>
+            <a:pPr marL="285750" indent="-285750">
+              <a:buFont typeface="Arial" panose="020B0604020202020204" pitchFamily="34" charset="0"/>
+              <a:buChar char="•"/>
+            </a:pPr>
+            <a:r>
+              <a:rPr lang="es-MX" dirty="0">
+                <a:solidFill>
+                  <a:schemeClr val="bg1"/>
+                </a:solidFill>
+              </a:rPr>
+              <a:t>Almacenar información para botones adelante y atrás</a:t>
+            </a:r>
+          </a:p>
+        </p:txBody>
+      </p:sp>
+      <p:sp>
+        <p:nvSpPr>
+          <p:cNvPr id="9" name="CuadroTexto 8">
+            <a:extLst>
+              <a:ext uri="{FF2B5EF4-FFF2-40B4-BE49-F238E27FC236}">
+                <a16:creationId xmlns:a16="http://schemas.microsoft.com/office/drawing/2014/main" id="{8E92587F-C28A-441E-A93F-1A3B97AEEE02}"/>
+              </a:ext>
+            </a:extLst>
+          </p:cNvPr>
+          <p:cNvSpPr txBox="1"/>
+          <p:nvPr/>
+        </p:nvSpPr>
+        <p:spPr>
+          <a:xfrm>
+            <a:off x="6096000" y="3675778"/>
+            <a:ext cx="6362163" cy="1477328"/>
+          </a:xfrm>
+          <a:prstGeom prst="rect">
+            <a:avLst/>
+          </a:prstGeom>
+          <a:noFill/>
+        </p:spPr>
+        <p:txBody>
+          <a:bodyPr wrap="square" rtlCol="0">
+            <a:spAutoFit/>
+          </a:bodyPr>
+          <a:lstStyle/>
+          <a:p>
+            <a:r>
+              <a:rPr lang="es-MX" dirty="0">
+                <a:solidFill>
+                  <a:schemeClr val="bg1"/>
+                </a:solidFill>
+              </a:rPr>
+              <a:t>Listas circulares:</a:t>
+            </a:r>
+          </a:p>
+          <a:p>
+            <a:pPr marL="285750" indent="-285750">
+              <a:buFont typeface="Arial" panose="020B0604020202020204" pitchFamily="34" charset="0"/>
+              <a:buChar char="•"/>
+            </a:pPr>
+            <a:r>
+              <a:rPr lang="es-MX" dirty="0">
+                <a:solidFill>
+                  <a:schemeClr val="bg1"/>
+                </a:solidFill>
+              </a:rPr>
+              <a:t>Canales de televisión</a:t>
+            </a:r>
+          </a:p>
+          <a:p>
+            <a:pPr marL="285750" indent="-285750">
+              <a:buFont typeface="Arial" panose="020B0604020202020204" pitchFamily="34" charset="0"/>
+              <a:buChar char="•"/>
+            </a:pPr>
+            <a:r>
+              <a:rPr lang="es-MX" dirty="0">
+                <a:solidFill>
+                  <a:schemeClr val="bg1"/>
+                </a:solidFill>
+              </a:rPr>
+              <a:t>Simulaciones cíclicas como el clima</a:t>
+            </a:r>
+          </a:p>
+          <a:p>
+            <a:pPr marL="285750" indent="-285750">
+              <a:buFont typeface="Arial" panose="020B0604020202020204" pitchFamily="34" charset="0"/>
+              <a:buChar char="•"/>
+            </a:pPr>
+            <a:r>
+              <a:rPr lang="es-MX" dirty="0">
+                <a:solidFill>
+                  <a:schemeClr val="bg1"/>
+                </a:solidFill>
+              </a:rPr>
+              <a:t>Funcionamiento de un reloj</a:t>
+            </a:r>
+          </a:p>
+          <a:p>
+            <a:pPr marL="285750" indent="-285750">
+              <a:buFont typeface="Arial" panose="020B0604020202020204" pitchFamily="34" charset="0"/>
+              <a:buChar char="•"/>
+            </a:pPr>
+            <a:endParaRPr lang="es-MX" dirty="0">
+              <a:solidFill>
+                <a:schemeClr val="bg1"/>
+              </a:solidFill>
+            </a:endParaRPr>
+          </a:p>
+        </p:txBody>
+      </p:sp>
+    </p:spTree>
+    <p:extLst>
+      <p:ext uri="{BB962C8B-B14F-4D97-AF65-F5344CB8AC3E}">
+        <p14:creationId xmlns:p14="http://schemas.microsoft.com/office/powerpoint/2010/main" val="3417466748"/>
+      </p:ext>
+    </p:extLst>
+  </p:cSld>
+  <p:clrMapOvr>
+    <a:masterClrMapping/>
+  </p:clrMapOvr>
+  <mc:AlternateContent xmlns:mc="http://schemas.openxmlformats.org/markup-compatibility/2006">
+    <mc:Choice xmlns:p14="http://schemas.microsoft.com/office/powerpoint/2010/main" Requires="p14">
+      <p:transition spd="slow" p14:dur="2000">
+        <p14:ferris dir="l"/>
+      </p:transition>
+    </mc:Choice>
+    <mc:Fallback>
+      <p:transition spd="slow">
+        <p:fade/>
+      </p:transition>
+    </mc:Fallback>
+  </mc:AlternateContent>
 </p:sld>
 </file>
 

</xml_diff>